<commit_message>
update links and changed time allocation
</commit_message>
<xml_diff>
--- a/events/2021-03-17/slides/00-index.pptx
+++ b/events/2021-03-17/slides/00-index.pptx
@@ -53515,15 +53515,15 @@
               <a:t>田浦</a:t>
             </a:r>
             <a:r>
-              <a:rPr kumimoji="1" lang="en-US" altLang="ja-JP" sz="2000" dirty="0"/>
+              <a:rPr kumimoji="1" lang="en-US" altLang="ja-JP" sz="2000"/>
               <a:t>; </a:t>
             </a:r>
             <a:r>
-              <a:rPr lang="en-US" altLang="ja-JP" sz="2000" dirty="0"/>
-              <a:t>20</a:t>
+              <a:rPr lang="en-US" altLang="ja-JP" sz="2000"/>
+              <a:t>25</a:t>
             </a:r>
             <a:r>
-              <a:rPr kumimoji="1" lang="ja-JP" altLang="en-US" sz="2000" dirty="0"/>
+              <a:rPr kumimoji="1" lang="ja-JP" altLang="en-US" sz="2000"/>
               <a:t>分</a:t>
             </a:r>
             <a:r>
@@ -53559,11 +53559,7 @@
             </a:r>
             <a:r>
               <a:rPr kumimoji="1" lang="en-US" altLang="ja-JP" sz="2000" dirty="0"/>
-              <a:t>; </a:t>
-            </a:r>
-            <a:r>
-              <a:rPr lang="en-US" altLang="ja-JP" sz="2000" dirty="0"/>
-              <a:t>20</a:t>
+              <a:t>; 15</a:t>
             </a:r>
             <a:r>
               <a:rPr kumimoji="1" lang="ja-JP" altLang="en-US" sz="2000" dirty="0"/>

</xml_diff>

<commit_message>
add a note on "request access" to google spreadsheet
</commit_message>
<xml_diff>
--- a/events/2021-03-17/slides/00-index.pptx
+++ b/events/2021-03-17/slides/00-index.pptx
@@ -53515,15 +53515,15 @@
               <a:t>田浦</a:t>
             </a:r>
             <a:r>
-              <a:rPr kumimoji="1" lang="en-US" altLang="ja-JP" sz="2000"/>
+              <a:rPr kumimoji="1" lang="en-US" altLang="ja-JP" sz="2000" dirty="0"/>
               <a:t>; </a:t>
             </a:r>
             <a:r>
-              <a:rPr lang="en-US" altLang="ja-JP" sz="2000"/>
+              <a:rPr lang="en-US" altLang="ja-JP" sz="2000" dirty="0"/>
               <a:t>25</a:t>
             </a:r>
             <a:r>
-              <a:rPr kumimoji="1" lang="ja-JP" altLang="en-US" sz="2000"/>
+              <a:rPr kumimoji="1" lang="ja-JP" altLang="en-US" sz="2000" dirty="0"/>
               <a:t>分</a:t>
             </a:r>
             <a:r>
@@ -53792,6 +53792,96 @@
               <a:t>5</a:t>
             </a:fld>
             <a:endParaRPr kumimoji="1" lang="ja-JP" altLang="en-US"/>
+          </a:p>
+        </p:txBody>
+      </p:sp>
+      <p:sp>
+        <p:nvSpPr>
+          <p:cNvPr id="7" name="正方形/長方形 6">
+            <a:extLst>
+              <a:ext uri="{FF2B5EF4-FFF2-40B4-BE49-F238E27FC236}">
+                <a16:creationId xmlns:a16="http://schemas.microsoft.com/office/drawing/2014/main" id="{E35EBA2B-7AAB-446B-B4AC-9F9982BDAD37}"/>
+              </a:ext>
+            </a:extLst>
+          </p:cNvPr>
+          <p:cNvSpPr/>
+          <p:nvPr/>
+        </p:nvSpPr>
+        <p:spPr>
+          <a:xfrm>
+            <a:off x="1331640" y="5157192"/>
+            <a:ext cx="6480720" cy="868945"/>
+          </a:xfrm>
+          <a:prstGeom prst="rect">
+            <a:avLst/>
+          </a:prstGeom>
+        </p:spPr>
+        <p:style>
+          <a:lnRef idx="2">
+            <a:schemeClr val="accent1">
+              <a:shade val="50000"/>
+            </a:schemeClr>
+          </a:lnRef>
+          <a:fillRef idx="1">
+            <a:schemeClr val="accent1"/>
+          </a:fillRef>
+          <a:effectRef idx="0">
+            <a:schemeClr val="accent1"/>
+          </a:effectRef>
+          <a:fontRef idx="minor">
+            <a:schemeClr val="lt1"/>
+          </a:fontRef>
+        </p:style>
+        <p:txBody>
+          <a:bodyPr rtlCol="0" anchor="ctr"/>
+          <a:lstStyle/>
+          <a:p>
+            <a:pPr algn="ctr"/>
+            <a:r>
+              <a:rPr kumimoji="1" lang="ja-JP" altLang="en-US" dirty="0">
+                <a:solidFill>
+                  <a:schemeClr val="tx1"/>
+                </a:solidFill>
+              </a:rPr>
+              <a:t>質問はいつでもウェビナーの</a:t>
+            </a:r>
+            <a:r>
+              <a:rPr kumimoji="1" lang="en-US" altLang="ja-JP" dirty="0">
+                <a:solidFill>
+                  <a:schemeClr val="tx1"/>
+                </a:solidFill>
+              </a:rPr>
+              <a:t>Q&amp;A</a:t>
+            </a:r>
+            <a:r>
+              <a:rPr kumimoji="1" lang="ja-JP" altLang="en-US" dirty="0">
+                <a:solidFill>
+                  <a:schemeClr val="tx1"/>
+                </a:solidFill>
+              </a:rPr>
+              <a:t>へ</a:t>
+            </a:r>
+            <a:endParaRPr kumimoji="1" lang="en-US" altLang="ja-JP" dirty="0">
+              <a:solidFill>
+                <a:schemeClr val="tx1"/>
+              </a:solidFill>
+            </a:endParaRPr>
+          </a:p>
+          <a:p>
+            <a:pPr algn="ctr"/>
+            <a:r>
+              <a:rPr lang="ja-JP" altLang="en-US" dirty="0">
+                <a:solidFill>
+                  <a:schemeClr val="tx1"/>
+                </a:solidFill>
+              </a:rPr>
+              <a:t>終わった後もなくなるまで受け付けます</a:t>
+            </a:r>
+            <a:endParaRPr kumimoji="1" lang="ja-JP" altLang="en-US" dirty="0">
+              <a:solidFill>
+                <a:schemeClr val="tx1"/>
+              </a:solidFill>
+            </a:endParaRPr>
           </a:p>
         </p:txBody>
       </p:sp>

</xml_diff>